<commit_message>
Powerpoint writer: Use table styles
This will use the default table style in the reference-doc file. As a
result they will be easier when using in a template, and match the
color scheme.
</commit_message>
<xml_diff>
--- a/test/pptx/tables.pptx
+++ b/test/pptx/tables.pptx
@@ -3186,7 +3186,9 @@
         <a:graphic>
           <a:graphicData uri="http://schemas.openxmlformats.org/drawingml/2006/table">
             <a:tbl>
-              <a:tblPr firstRow="1" bandRow="1"/>
+              <a:tblPr firstRow="1" bandRow="1">
+                <a:tableStyleId>{5C22544A-7EE6-4342-B048-85BDC9FD1C3A}</a:tableStyleId>
+              </a:tblPr>
               <a:tblGrid>
                 <a:gridCol w="2057400"/>
                 <a:gridCol w="2057400"/>
@@ -3566,7 +3568,9 @@
         <a:graphic>
           <a:graphicData uri="http://schemas.openxmlformats.org/drawingml/2006/table">
             <a:tbl>
-              <a:tblPr firstRow="1" bandRow="1"/>
+              <a:tblPr firstRow="1" bandRow="1">
+                <a:tableStyleId>{5C22544A-7EE6-4342-B048-85BDC9FD1C3A}</a:tableStyleId>
+              </a:tblPr>
               <a:tblGrid>
                 <a:gridCol w="2057400"/>
                 <a:gridCol w="2057400"/>

</xml_diff>